<commit_message>
Update cloud functions without Flask
</commit_message>
<xml_diff>
--- a/docs/Presentazione.pptx
+++ b/docs/Presentazione.pptx
@@ -217,7 +217,7 @@
           <a:p>
             <a:fld id="{FF1F0FE3-D4CE-4171-ABC2-FB4E21827698}" type="datetimeFigureOut">
               <a:rPr lang="it-IT" smtClean="0"/>
-              <a:t>25/09/2024</a:t>
+              <a:t>26/09/2024</a:t>
             </a:fld>
             <a:endParaRPr lang="it-IT"/>
           </a:p>
@@ -398,7 +398,7 @@
           <a:p>
             <a:fld id="{3693B9D8-0891-4513-AD05-CF354E01EACB}" type="datetimeFigureOut">
               <a:rPr lang="it-IT" smtClean="0"/>
-              <a:t>25/09/2024</a:t>
+              <a:t>26/09/2024</a:t>
             </a:fld>
             <a:endParaRPr lang="it-IT"/>
           </a:p>
@@ -883,7 +883,7 @@
           <a:p>
             <a:fld id="{012C41DE-F58E-46A6-BFBC-4CCF9ED90B24}" type="datetime1">
               <a:rPr lang="it-IT" smtClean="0"/>
-              <a:t>25/09/2024</a:t>
+              <a:t>26/09/2024</a:t>
             </a:fld>
             <a:endParaRPr lang="it-IT"/>
           </a:p>
@@ -1056,7 +1056,7 @@
           <a:p>
             <a:fld id="{F459E706-EC98-4329-A342-8F2A4A0ABD71}" type="datetime1">
               <a:rPr lang="it-IT" smtClean="0"/>
-              <a:t>25/09/2024</a:t>
+              <a:t>26/09/2024</a:t>
             </a:fld>
             <a:endParaRPr lang="it-IT"/>
           </a:p>
@@ -1239,7 +1239,7 @@
           <a:p>
             <a:fld id="{207ACF66-6CF7-44B0-BBAE-224A2E991DD6}" type="datetime1">
               <a:rPr lang="it-IT" smtClean="0"/>
-              <a:t>25/09/2024</a:t>
+              <a:t>26/09/2024</a:t>
             </a:fld>
             <a:endParaRPr lang="it-IT"/>
           </a:p>
@@ -1412,7 +1412,7 @@
           <a:p>
             <a:fld id="{02920648-773E-4D80-875C-A900F0419A99}" type="datetime1">
               <a:rPr lang="it-IT" smtClean="0"/>
-              <a:t>25/09/2024</a:t>
+              <a:t>26/09/2024</a:t>
             </a:fld>
             <a:endParaRPr lang="it-IT"/>
           </a:p>
@@ -1661,7 +1661,7 @@
           <a:p>
             <a:fld id="{FCAA43E6-1ADE-4241-8DC7-49CE668D4171}" type="datetime1">
               <a:rPr lang="it-IT" smtClean="0"/>
-              <a:t>25/09/2024</a:t>
+              <a:t>26/09/2024</a:t>
             </a:fld>
             <a:endParaRPr lang="it-IT"/>
           </a:p>
@@ -1896,7 +1896,7 @@
           <a:p>
             <a:fld id="{3516627E-ED38-4EC4-875E-00B88F11E476}" type="datetime1">
               <a:rPr lang="it-IT" smtClean="0"/>
-              <a:t>25/09/2024</a:t>
+              <a:t>26/09/2024</a:t>
             </a:fld>
             <a:endParaRPr lang="it-IT"/>
           </a:p>
@@ -2266,7 +2266,7 @@
           <a:p>
             <a:fld id="{8017760D-CF60-4C53-BF06-8C4EAA6BD619}" type="datetime1">
               <a:rPr lang="it-IT" smtClean="0"/>
-              <a:t>25/09/2024</a:t>
+              <a:t>26/09/2024</a:t>
             </a:fld>
             <a:endParaRPr lang="it-IT"/>
           </a:p>
@@ -2387,7 +2387,7 @@
           <a:p>
             <a:fld id="{5D666331-D417-46B4-8B18-7235EF560CF8}" type="datetime1">
               <a:rPr lang="it-IT" smtClean="0"/>
-              <a:t>25/09/2024</a:t>
+              <a:t>26/09/2024</a:t>
             </a:fld>
             <a:endParaRPr lang="it-IT"/>
           </a:p>
@@ -2485,7 +2485,7 @@
           <a:p>
             <a:fld id="{B343E9C7-C8BF-4BE8-8CF1-99AE373B6D6C}" type="datetime1">
               <a:rPr lang="it-IT" smtClean="0"/>
-              <a:t>25/09/2024</a:t>
+              <a:t>26/09/2024</a:t>
             </a:fld>
             <a:endParaRPr lang="it-IT"/>
           </a:p>
@@ -2765,7 +2765,7 @@
           <a:p>
             <a:fld id="{3C678EB6-8504-4D5A-98D3-9FD86CBBBEAD}" type="datetime1">
               <a:rPr lang="it-IT" smtClean="0"/>
-              <a:t>25/09/2024</a:t>
+              <a:t>26/09/2024</a:t>
             </a:fld>
             <a:endParaRPr lang="it-IT"/>
           </a:p>
@@ -3025,7 +3025,7 @@
           <a:p>
             <a:fld id="{89E5778C-6BF6-4207-AEE1-A199323633BA}" type="datetime1">
               <a:rPr lang="it-IT" smtClean="0"/>
-              <a:t>25/09/2024</a:t>
+              <a:t>26/09/2024</a:t>
             </a:fld>
             <a:endParaRPr lang="it-IT"/>
           </a:p>
@@ -3241,7 +3241,7 @@
           <a:p>
             <a:fld id="{E1997C6A-354E-4B7E-B020-1640364AC421}" type="datetime1">
               <a:rPr lang="it-IT" smtClean="0"/>
-              <a:t>25/09/2024</a:t>
+              <a:t>26/09/2024</a:t>
             </a:fld>
             <a:endParaRPr lang="it-IT"/>
           </a:p>
@@ -4660,17 +4660,8 @@
               <a:rPr lang="it-IT" dirty="0">
                 <a:latin typeface="AscenderSansW01-Regular" panose="020B0604020202020204" pitchFamily="34" charset="0"/>
               </a:rPr>
-              <a:t>Ascolta tramite </a:t>
-            </a:r>
-            <a:r>
-              <a:rPr lang="it-IT" dirty="0" err="1">
-                <a:latin typeface="AscenderSansW01-Regular" panose="020B0604020202020204" pitchFamily="34" charset="0"/>
-              </a:rPr>
-              <a:t>Flask</a:t>
-            </a:r>
-            <a:endParaRPr lang="it-IT" dirty="0">
-              <a:latin typeface="AscenderSansW01-Regular" panose="020B0604020202020204" pitchFamily="34" charset="0"/>
-            </a:endParaRPr>
+              <a:t>Riceve richiesta tramite API REST</a:t>
+            </a:r>
           </a:p>
           <a:p>
             <a:r>
@@ -5176,7 +5167,7 @@
           </a:p>
           <a:p>
             <a:r>
-              <a:rPr lang="it-IT" dirty="0">
+              <a:rPr lang="it-IT" sz="2400" dirty="0">
                 <a:latin typeface="AscenderSansW01-Regular" panose="020B0604020202020204" pitchFamily="34" charset="0"/>
               </a:rPr>
               <a:t>Scatta foto dalla webcam del pc</a:t>
@@ -5184,24 +5175,24 @@
           </a:p>
           <a:p>
             <a:r>
-              <a:rPr lang="it-IT" dirty="0">
+              <a:rPr lang="it-IT" sz="2400" dirty="0">
                 <a:latin typeface="AscenderSansW01-Regular" panose="020B0604020202020204" pitchFamily="34" charset="0"/>
               </a:rPr>
               <a:t>Invia dati ad una </a:t>
             </a:r>
             <a:r>
-              <a:rPr lang="it-IT" dirty="0" err="1">
+              <a:rPr lang="it-IT" sz="2400" dirty="0" err="1">
                 <a:latin typeface="AscenderSansW01-Regular" panose="020B0604020202020204" pitchFamily="34" charset="0"/>
               </a:rPr>
               <a:t>gfunction</a:t>
             </a:r>
-            <a:endParaRPr lang="it-IT" dirty="0">
+            <a:endParaRPr lang="it-IT" sz="2400" dirty="0">
               <a:latin typeface="AscenderSansW01-Regular" panose="020B0604020202020204" pitchFamily="34" charset="0"/>
             </a:endParaRPr>
           </a:p>
           <a:p>
             <a:r>
-              <a:rPr lang="it-IT" dirty="0">
+              <a:rPr lang="it-IT" sz="2400" dirty="0">
                 <a:latin typeface="AscenderSansW01-Regular" panose="020B0604020202020204" pitchFamily="34" charset="0"/>
               </a:rPr>
               <a:t>Una foto al minuto</a:t>
@@ -5242,40 +5233,31 @@
           </a:p>
           <a:p>
             <a:r>
-              <a:rPr lang="it-IT" sz="2400" dirty="0">
+              <a:rPr lang="it-IT" sz="2000" dirty="0">
                 <a:latin typeface="AscenderSansW01-Regular" panose="020B0604020202020204" pitchFamily="34" charset="0"/>
               </a:rPr>
-              <a:t>Ascolta tramite </a:t>
-            </a:r>
-            <a:r>
-              <a:rPr lang="it-IT" sz="2400" dirty="0" err="1">
+              <a:t>Riceve richiesta tramite API REST</a:t>
+            </a:r>
+          </a:p>
+          <a:p>
+            <a:r>
+              <a:rPr lang="it-IT" sz="2000" dirty="0">
                 <a:latin typeface="AscenderSansW01-Regular" panose="020B0604020202020204" pitchFamily="34" charset="0"/>
               </a:rPr>
-              <a:t>Flask</a:t>
-            </a:r>
-            <a:endParaRPr lang="it-IT" sz="2400" dirty="0">
-              <a:latin typeface="AscenderSansW01-Regular" panose="020B0604020202020204" pitchFamily="34" charset="0"/>
-            </a:endParaRPr>
-          </a:p>
-          <a:p>
-            <a:r>
-              <a:rPr lang="it-IT" sz="2400" dirty="0">
+              <a:t>Analizza l’immagine tramite computer vision</a:t>
+            </a:r>
+          </a:p>
+          <a:p>
+            <a:r>
+              <a:rPr lang="it-IT" sz="2000" dirty="0">
                 <a:latin typeface="AscenderSansW01-Regular" panose="020B0604020202020204" pitchFamily="34" charset="0"/>
               </a:rPr>
-              <a:t>Analizza l’immagine tramite computer vision</a:t>
-            </a:r>
-          </a:p>
-          <a:p>
-            <a:r>
-              <a:rPr lang="it-IT" sz="2400" dirty="0">
-                <a:latin typeface="AscenderSansW01-Regular" panose="020B0604020202020204" pitchFamily="34" charset="0"/>
-              </a:rPr>
               <a:t>Invio mail se ci sono 2 volti</a:t>
             </a:r>
           </a:p>
           <a:p>
             <a:r>
-              <a:rPr lang="it-IT" sz="2400" dirty="0">
+              <a:rPr lang="it-IT" sz="2000" dirty="0">
                 <a:latin typeface="AscenderSansW01-Regular" panose="020B0604020202020204" pitchFamily="34" charset="0"/>
               </a:rPr>
               <a:t>Maggiori risorse</a:t>
@@ -5515,7 +5497,7 @@
         </p:blipFill>
         <p:spPr bwMode="auto">
           <a:xfrm rot="20866965" flipH="1">
-            <a:off x="1314462" y="4575821"/>
+            <a:off x="1428762" y="4392040"/>
             <a:ext cx="1066385" cy="1918334"/>
           </a:xfrm>
           <a:prstGeom prst="rect">
@@ -5562,7 +5544,7 @@
         </p:blipFill>
         <p:spPr bwMode="auto">
           <a:xfrm>
-            <a:off x="4000982" y="5130163"/>
+            <a:off x="5258283" y="4844113"/>
             <a:ext cx="1713533" cy="1059534"/>
           </a:xfrm>
           <a:prstGeom prst="rect">

</xml_diff>